<commit_message>
enable queue based tests
</commit_message>
<xml_diff>
--- a/documents/demos.pptx
+++ b/documents/demos.pptx
@@ -3374,7 +3374,12 @@
             <p:ph idx="1"/>
           </p:nvPr>
         </p:nvSpPr>
-        <p:spPr/>
+        <p:spPr>
+          <a:xfrm>
+            <a:off x="838200" y="1825625"/>
+            <a:ext cx="10515600" cy="4957560"/>
+          </a:xfrm>
+        </p:spPr>
         <p:txBody>
           <a:bodyPr>
             <a:noAutofit/>

</xml_diff>